<commit_message>
fixed typo in powerpoint
</commit_message>
<xml_diff>
--- a/Class 5.pptx
+++ b/Class 5.pptx
@@ -309,7 +309,7 @@
           <a:p>
             <a:fld id="{DB10E5C9-23B2-4A4E-92AB-29D98A655667}" type="datetimeFigureOut">
               <a:rPr lang="en-US" smtClean="0"/>
-              <a:t>9/11/18</a:t>
+              <a:t>9/11/2018</a:t>
             </a:fld>
             <a:endParaRPr lang="en-US"/>
           </a:p>
@@ -639,7 +639,7 @@
           <a:p>
             <a:fld id="{DB10E5C9-23B2-4A4E-92AB-29D98A655667}" type="datetimeFigureOut">
               <a:rPr lang="en-US" smtClean="0"/>
-              <a:t>9/11/18</a:t>
+              <a:t>9/11/2018</a:t>
             </a:fld>
             <a:endParaRPr lang="en-US"/>
           </a:p>
@@ -819,7 +819,7 @@
           <a:p>
             <a:fld id="{DB10E5C9-23B2-4A4E-92AB-29D98A655667}" type="datetimeFigureOut">
               <a:rPr lang="en-US" smtClean="0"/>
-              <a:t>9/11/18</a:t>
+              <a:t>9/11/2018</a:t>
             </a:fld>
             <a:endParaRPr lang="en-US"/>
           </a:p>
@@ -989,7 +989,7 @@
           <a:p>
             <a:fld id="{DB10E5C9-23B2-4A4E-92AB-29D98A655667}" type="datetimeFigureOut">
               <a:rPr lang="en-US" smtClean="0"/>
-              <a:t>9/11/18</a:t>
+              <a:t>9/11/2018</a:t>
             </a:fld>
             <a:endParaRPr lang="en-US"/>
           </a:p>
@@ -1266,7 +1266,7 @@
           <a:p>
             <a:fld id="{DB10E5C9-23B2-4A4E-92AB-29D98A655667}" type="datetimeFigureOut">
               <a:rPr lang="en-US" smtClean="0"/>
-              <a:t>9/11/18</a:t>
+              <a:t>9/11/2018</a:t>
             </a:fld>
             <a:endParaRPr lang="en-US"/>
           </a:p>
@@ -1660,7 +1660,7 @@
           <a:p>
             <a:fld id="{DB10E5C9-23B2-4A4E-92AB-29D98A655667}" type="datetimeFigureOut">
               <a:rPr lang="en-US" smtClean="0"/>
-              <a:t>9/11/18</a:t>
+              <a:t>9/11/2018</a:t>
             </a:fld>
             <a:endParaRPr lang="en-US"/>
           </a:p>
@@ -2137,7 +2137,7 @@
           <a:p>
             <a:fld id="{DB10E5C9-23B2-4A4E-92AB-29D98A655667}" type="datetimeFigureOut">
               <a:rPr lang="en-US" smtClean="0"/>
-              <a:t>9/11/18</a:t>
+              <a:t>9/11/2018</a:t>
             </a:fld>
             <a:endParaRPr lang="en-US"/>
           </a:p>
@@ -2255,7 +2255,7 @@
           <a:p>
             <a:fld id="{DB10E5C9-23B2-4A4E-92AB-29D98A655667}" type="datetimeFigureOut">
               <a:rPr lang="en-US" smtClean="0"/>
-              <a:t>9/11/18</a:t>
+              <a:t>9/11/2018</a:t>
             </a:fld>
             <a:endParaRPr lang="en-US"/>
           </a:p>
@@ -2350,7 +2350,7 @@
           <a:p>
             <a:fld id="{DB10E5C9-23B2-4A4E-92AB-29D98A655667}" type="datetimeFigureOut">
               <a:rPr lang="en-US" smtClean="0"/>
-              <a:t>9/11/18</a:t>
+              <a:t>9/11/2018</a:t>
             </a:fld>
             <a:endParaRPr lang="en-US"/>
           </a:p>
@@ -2696,7 +2696,7 @@
           <a:p>
             <a:fld id="{DB10E5C9-23B2-4A4E-92AB-29D98A655667}" type="datetimeFigureOut">
               <a:rPr lang="en-US" smtClean="0"/>
-              <a:t>9/11/18</a:t>
+              <a:t>9/11/2018</a:t>
             </a:fld>
             <a:endParaRPr lang="en-US"/>
           </a:p>
@@ -3084,7 +3084,7 @@
           <a:p>
             <a:fld id="{DB10E5C9-23B2-4A4E-92AB-29D98A655667}" type="datetimeFigureOut">
               <a:rPr lang="en-US" smtClean="0"/>
-              <a:t>9/11/18</a:t>
+              <a:t>9/11/2018</a:t>
             </a:fld>
             <a:endParaRPr lang="en-US"/>
           </a:p>
@@ -3362,7 +3362,7 @@
           <a:p>
             <a:fld id="{DB10E5C9-23B2-4A4E-92AB-29D98A655667}" type="datetimeFigureOut">
               <a:rPr lang="en-US" smtClean="0"/>
-              <a:t>9/11/18</a:t>
+              <a:t>9/11/2018</a:t>
             </a:fld>
             <a:endParaRPr lang="en-US"/>
           </a:p>
@@ -5407,7 +5407,15 @@
           <a:p>
             <a:r>
               <a:rPr lang="en-US" dirty="0"/>
-              <a:t>By using the observer event we can like 3 action buttons (edit, cancel &amp; submit) together which all impact the UI or data in a similar way</a:t>
+              <a:t>By using the observer event we </a:t>
+            </a:r>
+            <a:r>
+              <a:rPr lang="en-US"/>
+              <a:t>can link </a:t>
+            </a:r>
+            <a:r>
+              <a:rPr lang="en-US" dirty="0"/>
+              <a:t>3 action buttons (edit, cancel &amp; submit) together which all impact the UI or data in a similar way</a:t>
             </a:r>
           </a:p>
         </p:txBody>

</xml_diff>